<commit_message>
Added features in doc
</commit_message>
<xml_diff>
--- a/doc/checkers_game.pptx
+++ b/doc/checkers_game.pptx
@@ -8,6 +8,8 @@
     <p:sldId id="256" r:id="rId2"/>
     <p:sldId id="257" r:id="rId3"/>
     <p:sldId id="258" r:id="rId4"/>
+    <p:sldId id="259" r:id="rId5"/>
+    <p:sldId id="260" r:id="rId6"/>
   </p:sldIdLst>
   <p:sldSz cx="12192000" cy="6858000"/>
   <p:notesSz cx="6858000" cy="9144000"/>
@@ -4825,6 +4827,269 @@
 </p:sld>
 </file>
 
+<file path=ppt/slides/slide4.xml><?xml version="1.0" encoding="utf-8"?>
+<p:sld xmlns:a="http://schemas.openxmlformats.org/drawingml/2006/main" xmlns:r="http://schemas.openxmlformats.org/officeDocument/2006/relationships" xmlns:p="http://schemas.openxmlformats.org/presentationml/2006/main">
+  <p:cSld>
+    <p:spTree>
+      <p:nvGrpSpPr>
+        <p:cNvPr id="1" name=""/>
+        <p:cNvGrpSpPr/>
+        <p:nvPr/>
+      </p:nvGrpSpPr>
+      <p:grpSpPr>
+        <a:xfrm>
+          <a:off x="0" y="0"/>
+          <a:ext cx="0" cy="0"/>
+          <a:chOff x="0" y="0"/>
+          <a:chExt cx="0" cy="0"/>
+        </a:xfrm>
+      </p:grpSpPr>
+      <p:sp>
+        <p:nvSpPr>
+          <p:cNvPr id="2" name="Title 1">
+            <a:extLst>
+              <a:ext uri="{FF2B5EF4-FFF2-40B4-BE49-F238E27FC236}">
+                <a16:creationId xmlns:a16="http://schemas.microsoft.com/office/drawing/2014/main" id="{D0062F52-BE70-CAC7-D9E8-03D982A77D28}"/>
+              </a:ext>
+            </a:extLst>
+          </p:cNvPr>
+          <p:cNvSpPr>
+            <a:spLocks noGrp="1"/>
+          </p:cNvSpPr>
+          <p:nvPr>
+            <p:ph type="title"/>
+          </p:nvPr>
+        </p:nvSpPr>
+        <p:spPr>
+          <a:xfrm>
+            <a:off x="386862" y="326606"/>
+            <a:ext cx="10268712" cy="1700784"/>
+          </a:xfrm>
+        </p:spPr>
+        <p:txBody>
+          <a:bodyPr/>
+          <a:lstStyle/>
+          <a:p>
+            <a:r>
+              <a:rPr lang="en-IN" dirty="0"/>
+              <a:t>Features </a:t>
+            </a:r>
+          </a:p>
+        </p:txBody>
+      </p:sp>
+      <p:sp>
+        <p:nvSpPr>
+          <p:cNvPr id="3" name="Content Placeholder 2">
+            <a:extLst>
+              <a:ext uri="{FF2B5EF4-FFF2-40B4-BE49-F238E27FC236}">
+                <a16:creationId xmlns:a16="http://schemas.microsoft.com/office/drawing/2014/main" id="{4FC451AD-0EC6-16C0-A66C-4BA42D5FF818}"/>
+              </a:ext>
+            </a:extLst>
+          </p:cNvPr>
+          <p:cNvSpPr>
+            <a:spLocks noGrp="1"/>
+          </p:cNvSpPr>
+          <p:nvPr>
+            <p:ph idx="1"/>
+          </p:nvPr>
+        </p:nvSpPr>
+        <p:spPr>
+          <a:xfrm>
+            <a:off x="386862" y="2479431"/>
+            <a:ext cx="11350869" cy="3935178"/>
+          </a:xfrm>
+        </p:spPr>
+        <p:txBody>
+          <a:bodyPr/>
+          <a:lstStyle/>
+          <a:p>
+            <a:pPr marL="514350" indent="-514350">
+              <a:buFont typeface="+mj-lt"/>
+              <a:buAutoNum type="arabicPeriod"/>
+            </a:pPr>
+            <a:r>
+              <a:rPr lang="en-US" dirty="0"/>
+              <a:t>Two players will play on screen. </a:t>
+            </a:r>
+          </a:p>
+          <a:p>
+            <a:pPr marL="514350" indent="-514350">
+              <a:buFont typeface="+mj-lt"/>
+              <a:buAutoNum type="arabicPeriod"/>
+            </a:pPr>
+            <a:r>
+              <a:rPr lang="en-US" dirty="0"/>
+              <a:t>The state of the game can be saved and the game can be continued. </a:t>
+            </a:r>
+          </a:p>
+          <a:p>
+            <a:pPr marL="514350" indent="-514350">
+              <a:buFont typeface="+mj-lt"/>
+              <a:buAutoNum type="arabicPeriod"/>
+            </a:pPr>
+            <a:r>
+              <a:rPr lang="en-US" dirty="0"/>
+              <a:t>Both versions of the game will be playable on the main screen.</a:t>
+            </a:r>
+          </a:p>
+          <a:p>
+            <a:pPr marL="514350" indent="-514350">
+              <a:buFont typeface="+mj-lt"/>
+              <a:buAutoNum type="arabicPeriod"/>
+            </a:pPr>
+            <a:r>
+              <a:rPr lang="en-US" dirty="0"/>
+              <a:t>Players will be able to click and point the pieces. </a:t>
+            </a:r>
+          </a:p>
+          <a:p>
+            <a:pPr marL="514350" indent="-514350">
+              <a:buFont typeface="+mj-lt"/>
+              <a:buAutoNum type="arabicPeriod"/>
+            </a:pPr>
+            <a:r>
+              <a:rPr lang="en-US" dirty="0"/>
+              <a:t>Players will be able to change the theme of the app. </a:t>
+            </a:r>
+          </a:p>
+          <a:p>
+            <a:pPr marL="514350" indent="-514350">
+              <a:buFont typeface="+mj-lt"/>
+              <a:buAutoNum type="arabicPeriod"/>
+            </a:pPr>
+            <a:r>
+              <a:rPr lang="en-US" dirty="0"/>
+              <a:t>Players will be able to play live over a local network.</a:t>
+            </a:r>
+          </a:p>
+          <a:p>
+            <a:pPr marL="514350" indent="-514350">
+              <a:buFont typeface="+mj-lt"/>
+              <a:buAutoNum type="arabicPeriod"/>
+            </a:pPr>
+            <a:endParaRPr lang="en-IN" dirty="0">
+              <a:latin typeface="Roboto" panose="02000000000000000000" pitchFamily="2" charset="0"/>
+              <a:ea typeface="Roboto" panose="02000000000000000000" pitchFamily="2" charset="0"/>
+            </a:endParaRPr>
+          </a:p>
+        </p:txBody>
+      </p:sp>
+    </p:spTree>
+    <p:extLst>
+      <p:ext uri="{BB962C8B-B14F-4D97-AF65-F5344CB8AC3E}">
+        <p14:creationId xmlns:p14="http://schemas.microsoft.com/office/powerpoint/2010/main" val="2529602679"/>
+      </p:ext>
+    </p:extLst>
+  </p:cSld>
+  <p:clrMapOvr>
+    <a:masterClrMapping/>
+  </p:clrMapOvr>
+</p:sld>
+</file>
+
+<file path=ppt/slides/slide5.xml><?xml version="1.0" encoding="utf-8"?>
+<p:sld xmlns:a="http://schemas.openxmlformats.org/drawingml/2006/main" xmlns:r="http://schemas.openxmlformats.org/officeDocument/2006/relationships" xmlns:p="http://schemas.openxmlformats.org/presentationml/2006/main">
+  <p:cSld>
+    <p:spTree>
+      <p:nvGrpSpPr>
+        <p:cNvPr id="1" name=""/>
+        <p:cNvGrpSpPr/>
+        <p:nvPr/>
+      </p:nvGrpSpPr>
+      <p:grpSpPr>
+        <a:xfrm>
+          <a:off x="0" y="0"/>
+          <a:ext cx="0" cy="0"/>
+          <a:chOff x="0" y="0"/>
+          <a:chExt cx="0" cy="0"/>
+        </a:xfrm>
+      </p:grpSpPr>
+      <p:sp>
+        <p:nvSpPr>
+          <p:cNvPr id="2" name="Title 1">
+            <a:extLst>
+              <a:ext uri="{FF2B5EF4-FFF2-40B4-BE49-F238E27FC236}">
+                <a16:creationId xmlns:a16="http://schemas.microsoft.com/office/drawing/2014/main" id="{D0062F52-BE70-CAC7-D9E8-03D982A77D28}"/>
+              </a:ext>
+            </a:extLst>
+          </p:cNvPr>
+          <p:cNvSpPr>
+            <a:spLocks noGrp="1"/>
+          </p:cNvSpPr>
+          <p:nvPr>
+            <p:ph type="title"/>
+          </p:nvPr>
+        </p:nvSpPr>
+        <p:spPr>
+          <a:xfrm>
+            <a:off x="386862" y="326606"/>
+            <a:ext cx="10268712" cy="1700784"/>
+          </a:xfrm>
+        </p:spPr>
+        <p:txBody>
+          <a:bodyPr/>
+          <a:lstStyle/>
+          <a:p>
+            <a:r>
+              <a:rPr lang="en-IN" dirty="0"/>
+              <a:t>Software requirements</a:t>
+            </a:r>
+          </a:p>
+        </p:txBody>
+      </p:sp>
+      <p:sp>
+        <p:nvSpPr>
+          <p:cNvPr id="3" name="Content Placeholder 2">
+            <a:extLst>
+              <a:ext uri="{FF2B5EF4-FFF2-40B4-BE49-F238E27FC236}">
+                <a16:creationId xmlns:a16="http://schemas.microsoft.com/office/drawing/2014/main" id="{4FC451AD-0EC6-16C0-A66C-4BA42D5FF818}"/>
+              </a:ext>
+            </a:extLst>
+          </p:cNvPr>
+          <p:cNvSpPr>
+            <a:spLocks noGrp="1"/>
+          </p:cNvSpPr>
+          <p:nvPr>
+            <p:ph idx="1"/>
+          </p:nvPr>
+        </p:nvSpPr>
+        <p:spPr>
+          <a:xfrm>
+            <a:off x="386862" y="2479431"/>
+            <a:ext cx="11350869" cy="3935178"/>
+          </a:xfrm>
+        </p:spPr>
+        <p:txBody>
+          <a:bodyPr/>
+          <a:lstStyle/>
+          <a:p>
+            <a:pPr marL="514350" indent="-514350">
+              <a:buFont typeface="+mj-lt"/>
+              <a:buAutoNum type="arabicPeriod"/>
+            </a:pPr>
+            <a:r>
+              <a:rPr lang="en-IN" dirty="0">
+                <a:latin typeface="Roboto" panose="02000000000000000000" pitchFamily="2" charset="0"/>
+                <a:ea typeface="Roboto" panose="02000000000000000000" pitchFamily="2" charset="0"/>
+              </a:rPr>
+              <a:t> </a:t>
+            </a:r>
+          </a:p>
+        </p:txBody>
+      </p:sp>
+    </p:spTree>
+    <p:extLst>
+      <p:ext uri="{BB962C8B-B14F-4D97-AF65-F5344CB8AC3E}">
+        <p14:creationId xmlns:p14="http://schemas.microsoft.com/office/powerpoint/2010/main" val="3476779618"/>
+      </p:ext>
+    </p:extLst>
+  </p:cSld>
+  <p:clrMapOvr>
+    <a:masterClrMapping/>
+  </p:clrMapOvr>
+</p:sld>
+</file>
+
 <file path=ppt/theme/theme1.xml><?xml version="1.0" encoding="utf-8"?>
 <a:theme xmlns:a="http://schemas.openxmlformats.org/drawingml/2006/main" name="JuxtaposeVTI">
   <a:themeElements>

</xml_diff>

<commit_message>
Added Thank You in doc
</commit_message>
<xml_diff>
--- a/doc/checkers_game.pptx
+++ b/doc/checkers_game.pptx
@@ -10,6 +10,7 @@
     <p:sldId id="258" r:id="rId4"/>
     <p:sldId id="259" r:id="rId5"/>
     <p:sldId id="260" r:id="rId6"/>
+    <p:sldId id="261" r:id="rId7"/>
   </p:sldIdLst>
   <p:sldSz cx="12192000" cy="6858000"/>
   <p:notesSz cx="6858000" cy="9144000"/>
@@ -14971,6 +14972,307 @@
 </p:sld>
 </file>
 
+<file path=ppt/slides/slide6.xml><?xml version="1.0" encoding="utf-8"?>
+<p:sld xmlns:a="http://schemas.openxmlformats.org/drawingml/2006/main" xmlns:r="http://schemas.openxmlformats.org/officeDocument/2006/relationships" xmlns:p="http://schemas.openxmlformats.org/presentationml/2006/main">
+  <p:cSld>
+    <p:bg>
+      <p:bgPr>
+        <a:solidFill>
+          <a:schemeClr val="bg1"/>
+        </a:solidFill>
+        <a:effectLst/>
+      </p:bgPr>
+    </p:bg>
+    <p:spTree>
+      <p:nvGrpSpPr>
+        <p:cNvPr id="1" name=""/>
+        <p:cNvGrpSpPr/>
+        <p:nvPr/>
+      </p:nvGrpSpPr>
+      <p:grpSpPr>
+        <a:xfrm>
+          <a:off x="0" y="0"/>
+          <a:ext cx="0" cy="0"/>
+          <a:chOff x="0" y="0"/>
+          <a:chExt cx="0" cy="0"/>
+        </a:xfrm>
+      </p:grpSpPr>
+      <p:sp>
+        <p:nvSpPr>
+          <p:cNvPr id="10" name="Rectangle 9">
+            <a:extLst>
+              <a:ext uri="{FF2B5EF4-FFF2-40B4-BE49-F238E27FC236}">
+                <a16:creationId xmlns:a16="http://schemas.microsoft.com/office/drawing/2014/main" id="{09A1C012-8297-4361-ACE8-A2509FB18911}"/>
+              </a:ext>
+              <a:ext uri="{C183D7F6-B498-43B3-948B-1728B52AA6E4}">
+                <adec:decorative xmlns:adec="http://schemas.microsoft.com/office/drawing/2017/decorative" val="1"/>
+              </a:ext>
+            </a:extLst>
+          </p:cNvPr>
+          <p:cNvSpPr>
+            <a:spLocks noGrp="1" noRot="1" noChangeAspect="1" noMove="1" noResize="1" noEditPoints="1" noAdjustHandles="1" noChangeArrowheads="1" noChangeShapeType="1" noTextEdit="1"/>
+          </p:cNvSpPr>
+          <p:nvPr>
+            <p:extLst>
+              <p:ext uri="{386F3935-93C4-4BCD-93E2-E3B085C9AB24}">
+                <p16:designElem xmlns:p16="http://schemas.microsoft.com/office/powerpoint/2015/main" val="1"/>
+              </p:ext>
+            </p:extLst>
+          </p:nvPr>
+        </p:nvSpPr>
+        <p:spPr>
+          <a:xfrm>
+            <a:off x="0" y="4206240"/>
+            <a:ext cx="12192000" cy="2651760"/>
+          </a:xfrm>
+          <a:prstGeom prst="rect">
+            <a:avLst/>
+          </a:prstGeom>
+          <a:solidFill>
+            <a:schemeClr val="tx1"/>
+          </a:solidFill>
+          <a:ln>
+            <a:noFill/>
+          </a:ln>
+        </p:spPr>
+        <p:style>
+          <a:lnRef idx="2">
+            <a:schemeClr val="accent1">
+              <a:shade val="50000"/>
+            </a:schemeClr>
+          </a:lnRef>
+          <a:fillRef idx="1">
+            <a:schemeClr val="accent1"/>
+          </a:fillRef>
+          <a:effectRef idx="0">
+            <a:schemeClr val="accent1"/>
+          </a:effectRef>
+          <a:fontRef idx="minor">
+            <a:schemeClr val="lt1"/>
+          </a:fontRef>
+        </p:style>
+        <p:txBody>
+          <a:bodyPr rtlCol="0" anchor="ctr"/>
+          <a:lstStyle/>
+          <a:p>
+            <a:pPr algn="ctr"/>
+            <a:endParaRPr lang="en-US"/>
+          </a:p>
+        </p:txBody>
+      </p:sp>
+      <p:sp useBgFill="1">
+        <p:nvSpPr>
+          <p:cNvPr id="12" name="Rectangle 11">
+            <a:extLst>
+              <a:ext uri="{FF2B5EF4-FFF2-40B4-BE49-F238E27FC236}">
+                <a16:creationId xmlns:a16="http://schemas.microsoft.com/office/drawing/2014/main" id="{4AA13AD3-0A4F-475A-BEBB-DEEFF5C096C3}"/>
+              </a:ext>
+              <a:ext uri="{C183D7F6-B498-43B3-948B-1728B52AA6E4}">
+                <adec:decorative xmlns:adec="http://schemas.microsoft.com/office/drawing/2017/decorative" val="1"/>
+              </a:ext>
+            </a:extLst>
+          </p:cNvPr>
+          <p:cNvSpPr>
+            <a:spLocks noGrp="1" noRot="1" noChangeAspect="1" noMove="1" noResize="1" noEditPoints="1" noAdjustHandles="1" noChangeArrowheads="1" noChangeShapeType="1" noTextEdit="1"/>
+          </p:cNvSpPr>
+          <p:nvPr>
+            <p:extLst>
+              <p:ext uri="{386F3935-93C4-4BCD-93E2-E3B085C9AB24}">
+                <p16:designElem xmlns:p16="http://schemas.microsoft.com/office/powerpoint/2015/main" val="1"/>
+              </p:ext>
+            </p:extLst>
+          </p:nvPr>
+        </p:nvSpPr>
+        <p:spPr>
+          <a:xfrm>
+            <a:off x="0" y="0"/>
+            <a:ext cx="12192000" cy="6858000"/>
+          </a:xfrm>
+          <a:prstGeom prst="rect">
+            <a:avLst/>
+          </a:prstGeom>
+          <a:ln>
+            <a:noFill/>
+          </a:ln>
+        </p:spPr>
+        <p:style>
+          <a:lnRef idx="2">
+            <a:schemeClr val="accent1">
+              <a:shade val="50000"/>
+            </a:schemeClr>
+          </a:lnRef>
+          <a:fillRef idx="1">
+            <a:schemeClr val="accent1"/>
+          </a:fillRef>
+          <a:effectRef idx="0">
+            <a:schemeClr val="accent1"/>
+          </a:effectRef>
+          <a:fontRef idx="minor">
+            <a:schemeClr val="lt1"/>
+          </a:fontRef>
+        </p:style>
+        <p:txBody>
+          <a:bodyPr rtlCol="0" anchor="ctr"/>
+          <a:lstStyle/>
+          <a:p>
+            <a:pPr algn="ctr"/>
+            <a:endParaRPr lang="en-US"/>
+          </a:p>
+        </p:txBody>
+      </p:sp>
+      <p:sp>
+        <p:nvSpPr>
+          <p:cNvPr id="14" name="Rectangle 13">
+            <a:extLst>
+              <a:ext uri="{FF2B5EF4-FFF2-40B4-BE49-F238E27FC236}">
+                <a16:creationId xmlns:a16="http://schemas.microsoft.com/office/drawing/2014/main" id="{D65E0E3C-32F3-480B-9842-7611BBE2EE9F}"/>
+              </a:ext>
+              <a:ext uri="{C183D7F6-B498-43B3-948B-1728B52AA6E4}">
+                <adec:decorative xmlns:adec="http://schemas.microsoft.com/office/drawing/2017/decorative" val="1"/>
+              </a:ext>
+            </a:extLst>
+          </p:cNvPr>
+          <p:cNvSpPr>
+            <a:spLocks noGrp="1" noRot="1" noChangeAspect="1" noMove="1" noResize="1" noEditPoints="1" noAdjustHandles="1" noChangeArrowheads="1" noChangeShapeType="1" noTextEdit="1"/>
+          </p:cNvSpPr>
+          <p:nvPr>
+            <p:extLst>
+              <p:ext uri="{386F3935-93C4-4BCD-93E2-E3B085C9AB24}">
+                <p16:designElem xmlns:p16="http://schemas.microsoft.com/office/powerpoint/2015/main" val="1"/>
+              </p:ext>
+            </p:extLst>
+          </p:nvPr>
+        </p:nvSpPr>
+        <p:spPr>
+          <a:xfrm>
+            <a:off x="0" y="4212708"/>
+            <a:ext cx="12192000" cy="2645291"/>
+          </a:xfrm>
+          <a:prstGeom prst="rect">
+            <a:avLst/>
+          </a:prstGeom>
+          <a:solidFill>
+            <a:schemeClr val="tx1">
+              <a:alpha val="88000"/>
+            </a:schemeClr>
+          </a:solidFill>
+          <a:ln>
+            <a:noFill/>
+          </a:ln>
+        </p:spPr>
+        <p:style>
+          <a:lnRef idx="2">
+            <a:schemeClr val="accent1">
+              <a:shade val="50000"/>
+            </a:schemeClr>
+          </a:lnRef>
+          <a:fillRef idx="1">
+            <a:schemeClr val="accent1"/>
+          </a:fillRef>
+          <a:effectRef idx="0">
+            <a:schemeClr val="accent1"/>
+          </a:effectRef>
+          <a:fontRef idx="minor">
+            <a:schemeClr val="lt1"/>
+          </a:fontRef>
+        </p:style>
+        <p:txBody>
+          <a:bodyPr rtlCol="0" anchor="ctr"/>
+          <a:lstStyle/>
+          <a:p>
+            <a:pPr algn="ctr"/>
+            <a:endParaRPr lang="en-US"/>
+          </a:p>
+        </p:txBody>
+      </p:sp>
+      <p:sp>
+        <p:nvSpPr>
+          <p:cNvPr id="2" name="Title 1">
+            <a:extLst>
+              <a:ext uri="{FF2B5EF4-FFF2-40B4-BE49-F238E27FC236}">
+                <a16:creationId xmlns:a16="http://schemas.microsoft.com/office/drawing/2014/main" id="{86B4D3CC-4EF2-00B1-5FBE-DB169873EEDB}"/>
+              </a:ext>
+            </a:extLst>
+          </p:cNvPr>
+          <p:cNvSpPr>
+            <a:spLocks noGrp="1"/>
+          </p:cNvSpPr>
+          <p:nvPr>
+            <p:ph type="title"/>
+          </p:nvPr>
+        </p:nvSpPr>
+        <p:spPr>
+          <a:xfrm>
+            <a:off x="961644" y="4572003"/>
+            <a:ext cx="10268712" cy="1169121"/>
+          </a:xfrm>
+        </p:spPr>
+        <p:txBody>
+          <a:bodyPr vert="horz" lIns="91440" tIns="45720" rIns="91440" bIns="45720" rtlCol="0" anchor="ctr">
+            <a:normAutofit/>
+          </a:bodyPr>
+          <a:lstStyle/>
+          <a:p>
+            <a:pPr algn="ctr"/>
+            <a:r>
+              <a:rPr lang="en-US" sz="7200" dirty="0"/>
+              <a:t>Thank You</a:t>
+            </a:r>
+          </a:p>
+        </p:txBody>
+      </p:sp>
+      <p:pic>
+        <p:nvPicPr>
+          <p:cNvPr id="7" name="Graphic 6" descr="Smiling Face with No Fill">
+            <a:extLst>
+              <a:ext uri="{FF2B5EF4-FFF2-40B4-BE49-F238E27FC236}">
+                <a16:creationId xmlns:a16="http://schemas.microsoft.com/office/drawing/2014/main" id="{4FE59529-0AF7-39FE-9336-788578A0433E}"/>
+              </a:ext>
+            </a:extLst>
+          </p:cNvPr>
+          <p:cNvPicPr>
+            <a:picLocks noChangeAspect="1"/>
+          </p:cNvPicPr>
+          <p:nvPr/>
+        </p:nvPicPr>
+        <p:blipFill>
+          <a:blip r:embed="rId2">
+            <a:extLst>
+              <a:ext uri="{28A0092B-C50C-407E-A947-70E740481C1C}">
+                <a14:useLocalDpi xmlns:a14="http://schemas.microsoft.com/office/drawing/2010/main" val="0"/>
+              </a:ext>
+              <a:ext uri="{96DAC541-7B7A-43D3-8B79-37D633B846F1}">
+                <asvg:svgBlip xmlns:asvg="http://schemas.microsoft.com/office/drawing/2016/SVG/main" r:embed="rId3"/>
+              </a:ext>
+            </a:extLst>
+          </a:blip>
+          <a:stretch>
+            <a:fillRect/>
+          </a:stretch>
+        </p:blipFill>
+        <p:spPr>
+          <a:xfrm>
+            <a:off x="4554668" y="639575"/>
+            <a:ext cx="3082664" cy="3082664"/>
+          </a:xfrm>
+          <a:prstGeom prst="rect">
+            <a:avLst/>
+          </a:prstGeom>
+        </p:spPr>
+      </p:pic>
+    </p:spTree>
+    <p:extLst>
+      <p:ext uri="{BB962C8B-B14F-4D97-AF65-F5344CB8AC3E}">
+        <p14:creationId xmlns:p14="http://schemas.microsoft.com/office/powerpoint/2010/main" val="857515871"/>
+      </p:ext>
+    </p:extLst>
+  </p:cSld>
+  <p:clrMapOvr>
+    <a:masterClrMapping/>
+  </p:clrMapOvr>
+</p:sld>
+</file>
+
 <file path=ppt/theme/theme1.xml><?xml version="1.0" encoding="utf-8"?>
 <a:theme xmlns:a="http://schemas.openxmlformats.org/drawingml/2006/main" name="JuxtaposeVTI">
   <a:themeElements>

</xml_diff>